<commit_message>
Update files for final submission
</commit_message>
<xml_diff>
--- a/Chapter 2 - Design/Use Cases.pptx
+++ b/Chapter 2 - Design/Use Cases.pptx
@@ -2,19 +2,19 @@
 <file path=ppt/presentation.xml><?xml version="1.0" encoding="utf-8"?>
 <p:presentation xmlns:a="http://schemas.openxmlformats.org/drawingml/2006/main" xmlns:r="http://schemas.openxmlformats.org/officeDocument/2006/relationships" xmlns:p="http://schemas.openxmlformats.org/presentationml/2006/main" saveSubsetFonts="1">
   <p:sldMasterIdLst>
-    <p:sldMasterId id="2147483660" r:id="rId1"/>
+    <p:sldMasterId id="2147483696" r:id="rId1"/>
   </p:sldMasterIdLst>
   <p:sldIdLst>
     <p:sldId id="256" r:id="rId2"/>
   </p:sldIdLst>
-  <p:sldSz cx="18000663" cy="18035588"/>
+  <p:sldSz cx="21599525" cy="21599525"/>
   <p:notesSz cx="6858000" cy="9144000"/>
   <p:defaultTextStyle>
     <a:defPPr>
       <a:defRPr lang="en-US"/>
     </a:defPPr>
-    <a:lvl1pPr marL="0" algn="l" defTabSz="617723" rtl="0" eaLnBrk="1" latinLnBrk="0" hangingPunct="1">
-      <a:defRPr sz="2432" kern="1200">
+    <a:lvl1pPr marL="0" algn="l" defTabSz="457200" rtl="0" eaLnBrk="1" latinLnBrk="0" hangingPunct="1">
+      <a:defRPr sz="1800" kern="1200">
         <a:solidFill>
           <a:schemeClr val="tx1"/>
         </a:solidFill>
@@ -23,8 +23,8 @@
         <a:cs typeface="+mn-cs"/>
       </a:defRPr>
     </a:lvl1pPr>
-    <a:lvl2pPr marL="617723" algn="l" defTabSz="617723" rtl="0" eaLnBrk="1" latinLnBrk="0" hangingPunct="1">
-      <a:defRPr sz="2432" kern="1200">
+    <a:lvl2pPr marL="457200" algn="l" defTabSz="457200" rtl="0" eaLnBrk="1" latinLnBrk="0" hangingPunct="1">
+      <a:defRPr sz="1800" kern="1200">
         <a:solidFill>
           <a:schemeClr val="tx1"/>
         </a:solidFill>
@@ -33,8 +33,8 @@
         <a:cs typeface="+mn-cs"/>
       </a:defRPr>
     </a:lvl2pPr>
-    <a:lvl3pPr marL="1235446" algn="l" defTabSz="617723" rtl="0" eaLnBrk="1" latinLnBrk="0" hangingPunct="1">
-      <a:defRPr sz="2432" kern="1200">
+    <a:lvl3pPr marL="914400" algn="l" defTabSz="457200" rtl="0" eaLnBrk="1" latinLnBrk="0" hangingPunct="1">
+      <a:defRPr sz="1800" kern="1200">
         <a:solidFill>
           <a:schemeClr val="tx1"/>
         </a:solidFill>
@@ -43,8 +43,8 @@
         <a:cs typeface="+mn-cs"/>
       </a:defRPr>
     </a:lvl3pPr>
-    <a:lvl4pPr marL="1853169" algn="l" defTabSz="617723" rtl="0" eaLnBrk="1" latinLnBrk="0" hangingPunct="1">
-      <a:defRPr sz="2432" kern="1200">
+    <a:lvl4pPr marL="1371600" algn="l" defTabSz="457200" rtl="0" eaLnBrk="1" latinLnBrk="0" hangingPunct="1">
+      <a:defRPr sz="1800" kern="1200">
         <a:solidFill>
           <a:schemeClr val="tx1"/>
         </a:solidFill>
@@ -53,8 +53,8 @@
         <a:cs typeface="+mn-cs"/>
       </a:defRPr>
     </a:lvl4pPr>
-    <a:lvl5pPr marL="2470892" algn="l" defTabSz="617723" rtl="0" eaLnBrk="1" latinLnBrk="0" hangingPunct="1">
-      <a:defRPr sz="2432" kern="1200">
+    <a:lvl5pPr marL="1828800" algn="l" defTabSz="457200" rtl="0" eaLnBrk="1" latinLnBrk="0" hangingPunct="1">
+      <a:defRPr sz="1800" kern="1200">
         <a:solidFill>
           <a:schemeClr val="tx1"/>
         </a:solidFill>
@@ -63,8 +63,8 @@
         <a:cs typeface="+mn-cs"/>
       </a:defRPr>
     </a:lvl5pPr>
-    <a:lvl6pPr marL="3088615" algn="l" defTabSz="617723" rtl="0" eaLnBrk="1" latinLnBrk="0" hangingPunct="1">
-      <a:defRPr sz="2432" kern="1200">
+    <a:lvl6pPr marL="2286000" algn="l" defTabSz="457200" rtl="0" eaLnBrk="1" latinLnBrk="0" hangingPunct="1">
+      <a:defRPr sz="1800" kern="1200">
         <a:solidFill>
           <a:schemeClr val="tx1"/>
         </a:solidFill>
@@ -73,8 +73,8 @@
         <a:cs typeface="+mn-cs"/>
       </a:defRPr>
     </a:lvl6pPr>
-    <a:lvl7pPr marL="3706338" algn="l" defTabSz="617723" rtl="0" eaLnBrk="1" latinLnBrk="0" hangingPunct="1">
-      <a:defRPr sz="2432" kern="1200">
+    <a:lvl7pPr marL="2743200" algn="l" defTabSz="457200" rtl="0" eaLnBrk="1" latinLnBrk="0" hangingPunct="1">
+      <a:defRPr sz="1800" kern="1200">
         <a:solidFill>
           <a:schemeClr val="tx1"/>
         </a:solidFill>
@@ -83,8 +83,8 @@
         <a:cs typeface="+mn-cs"/>
       </a:defRPr>
     </a:lvl7pPr>
-    <a:lvl8pPr marL="4324060" algn="l" defTabSz="617723" rtl="0" eaLnBrk="1" latinLnBrk="0" hangingPunct="1">
-      <a:defRPr sz="2432" kern="1200">
+    <a:lvl8pPr marL="3200400" algn="l" defTabSz="457200" rtl="0" eaLnBrk="1" latinLnBrk="0" hangingPunct="1">
+      <a:defRPr sz="1800" kern="1200">
         <a:solidFill>
           <a:schemeClr val="tx1"/>
         </a:solidFill>
@@ -93,8 +93,8 @@
         <a:cs typeface="+mn-cs"/>
       </a:defRPr>
     </a:lvl8pPr>
-    <a:lvl9pPr marL="4941783" algn="l" defTabSz="617723" rtl="0" eaLnBrk="1" latinLnBrk="0" hangingPunct="1">
-      <a:defRPr sz="2432" kern="1200">
+    <a:lvl9pPr marL="3657600" algn="l" defTabSz="457200" rtl="0" eaLnBrk="1" latinLnBrk="0" hangingPunct="1">
+      <a:defRPr sz="1800" kern="1200">
         <a:solidFill>
           <a:schemeClr val="tx1"/>
         </a:solidFill>
@@ -141,15 +141,15 @@
         </p:nvSpPr>
         <p:spPr>
           <a:xfrm>
-            <a:off x="1350050" y="2951658"/>
-            <a:ext cx="15300564" cy="6279057"/>
+            <a:off x="1619965" y="3534924"/>
+            <a:ext cx="18359596" cy="7519835"/>
           </a:xfrm>
         </p:spPr>
         <p:txBody>
           <a:bodyPr anchor="b"/>
           <a:lstStyle>
             <a:lvl1pPr algn="ctr">
-              <a:defRPr sz="11812"/>
+              <a:defRPr sz="14173"/>
             </a:lvl1pPr>
           </a:lstStyle>
           <a:p>
@@ -173,8 +173,8 @@
         </p:nvSpPr>
         <p:spPr>
           <a:xfrm>
-            <a:off x="2250083" y="9472862"/>
-            <a:ext cx="13500497" cy="4354425"/>
+            <a:off x="2699941" y="11344752"/>
+            <a:ext cx="16199644" cy="5214884"/>
           </a:xfrm>
         </p:spPr>
         <p:txBody>
@@ -182,39 +182,39 @@
           <a:lstStyle>
             <a:lvl1pPr marL="0" indent="0" algn="ctr">
               <a:buNone/>
-              <a:defRPr sz="4725"/>
+              <a:defRPr sz="5669"/>
             </a:lvl1pPr>
-            <a:lvl2pPr marL="900016" indent="0" algn="ctr">
-              <a:buNone/>
-              <a:defRPr sz="3937"/>
+            <a:lvl2pPr marL="1079998" indent="0" algn="ctr">
+              <a:buNone/>
+              <a:defRPr sz="4724"/>
             </a:lvl2pPr>
-            <a:lvl3pPr marL="1800030" indent="0" algn="ctr">
-              <a:buNone/>
-              <a:defRPr sz="3543"/>
+            <a:lvl3pPr marL="2159996" indent="0" algn="ctr">
+              <a:buNone/>
+              <a:defRPr sz="4252"/>
             </a:lvl3pPr>
-            <a:lvl4pPr marL="2700046" indent="0" algn="ctr">
-              <a:buNone/>
-              <a:defRPr sz="3150"/>
+            <a:lvl4pPr marL="3239994" indent="0" algn="ctr">
+              <a:buNone/>
+              <a:defRPr sz="3780"/>
             </a:lvl4pPr>
-            <a:lvl5pPr marL="3600062" indent="0" algn="ctr">
-              <a:buNone/>
-              <a:defRPr sz="3150"/>
+            <a:lvl5pPr marL="4319991" indent="0" algn="ctr">
+              <a:buNone/>
+              <a:defRPr sz="3780"/>
             </a:lvl5pPr>
-            <a:lvl6pPr marL="4500076" indent="0" algn="ctr">
-              <a:buNone/>
-              <a:defRPr sz="3150"/>
+            <a:lvl6pPr marL="5399989" indent="0" algn="ctr">
+              <a:buNone/>
+              <a:defRPr sz="3780"/>
             </a:lvl6pPr>
-            <a:lvl7pPr marL="5400092" indent="0" algn="ctr">
-              <a:buNone/>
-              <a:defRPr sz="3150"/>
+            <a:lvl7pPr marL="6479987" indent="0" algn="ctr">
+              <a:buNone/>
+              <a:defRPr sz="3780"/>
             </a:lvl7pPr>
-            <a:lvl8pPr marL="6300108" indent="0" algn="ctr">
-              <a:buNone/>
-              <a:defRPr sz="3150"/>
+            <a:lvl8pPr marL="7559985" indent="0" algn="ctr">
+              <a:buNone/>
+              <a:defRPr sz="3780"/>
             </a:lvl8pPr>
-            <a:lvl9pPr marL="7200122" indent="0" algn="ctr">
-              <a:buNone/>
-              <a:defRPr sz="3150"/>
+            <a:lvl9pPr marL="8639983" indent="0" algn="ctr">
+              <a:buNone/>
+              <a:defRPr sz="3780"/>
             </a:lvl9pPr>
           </a:lstStyle>
           <a:p>
@@ -294,7 +294,7 @@
     </p:spTree>
     <p:extLst>
       <p:ext uri="{BB962C8B-B14F-4D97-AF65-F5344CB8AC3E}">
-        <p14:creationId xmlns:p14="http://schemas.microsoft.com/office/powerpoint/2010/main" val="1089827679"/>
+        <p14:creationId xmlns:p14="http://schemas.microsoft.com/office/powerpoint/2010/main" val="3987650219"/>
       </p:ext>
     </p:extLst>
   </p:cSld>
@@ -464,7 +464,7 @@
     </p:spTree>
     <p:extLst>
       <p:ext uri="{BB962C8B-B14F-4D97-AF65-F5344CB8AC3E}">
-        <p14:creationId xmlns:p14="http://schemas.microsoft.com/office/powerpoint/2010/main" val="480737532"/>
+        <p14:creationId xmlns:p14="http://schemas.microsoft.com/office/powerpoint/2010/main" val="3171940479"/>
       </p:ext>
     </p:extLst>
   </p:cSld>
@@ -503,8 +503,8 @@
         </p:nvSpPr>
         <p:spPr>
           <a:xfrm>
-            <a:off x="12881727" y="960231"/>
-            <a:ext cx="3881393" cy="15284327"/>
+            <a:off x="15457161" y="1149975"/>
+            <a:ext cx="4657398" cy="18304599"/>
           </a:xfrm>
         </p:spPr>
         <p:txBody>
@@ -531,8 +531,8 @@
         </p:nvSpPr>
         <p:spPr>
           <a:xfrm>
-            <a:off x="1237547" y="960231"/>
-            <a:ext cx="11419171" cy="15284327"/>
+            <a:off x="1484968" y="1149975"/>
+            <a:ext cx="13702199" cy="18304599"/>
           </a:xfrm>
         </p:spPr>
         <p:txBody>
@@ -644,7 +644,7 @@
     </p:spTree>
     <p:extLst>
       <p:ext uri="{BB962C8B-B14F-4D97-AF65-F5344CB8AC3E}">
-        <p14:creationId xmlns:p14="http://schemas.microsoft.com/office/powerpoint/2010/main" val="1016037013"/>
+        <p14:creationId xmlns:p14="http://schemas.microsoft.com/office/powerpoint/2010/main" val="3581600442"/>
       </p:ext>
     </p:extLst>
   </p:cSld>
@@ -814,7 +814,7 @@
     </p:spTree>
     <p:extLst>
       <p:ext uri="{BB962C8B-B14F-4D97-AF65-F5344CB8AC3E}">
-        <p14:creationId xmlns:p14="http://schemas.microsoft.com/office/powerpoint/2010/main" val="422989784"/>
+        <p14:creationId xmlns:p14="http://schemas.microsoft.com/office/powerpoint/2010/main" val="3574132175"/>
       </p:ext>
     </p:extLst>
   </p:cSld>
@@ -853,15 +853,15 @@
         </p:nvSpPr>
         <p:spPr>
           <a:xfrm>
-            <a:off x="1228171" y="4496377"/>
-            <a:ext cx="15525572" cy="7502303"/>
+            <a:off x="1473719" y="5384888"/>
+            <a:ext cx="18629590" cy="8984801"/>
           </a:xfrm>
         </p:spPr>
         <p:txBody>
           <a:bodyPr anchor="b"/>
           <a:lstStyle>
             <a:lvl1pPr>
-              <a:defRPr sz="11812"/>
+              <a:defRPr sz="14173"/>
             </a:lvl1pPr>
           </a:lstStyle>
           <a:p>
@@ -885,8 +885,8 @@
         </p:nvSpPr>
         <p:spPr>
           <a:xfrm>
-            <a:off x="1228171" y="12069654"/>
-            <a:ext cx="15525572" cy="3945284"/>
+            <a:off x="1473719" y="14454688"/>
+            <a:ext cx="18629590" cy="4724895"/>
           </a:xfrm>
         </p:spPr>
         <p:txBody>
@@ -894,7 +894,7 @@
           <a:lstStyle>
             <a:lvl1pPr marL="0" indent="0">
               <a:buNone/>
-              <a:defRPr sz="4725">
+              <a:defRPr sz="5669">
                 <a:solidFill>
                   <a:schemeClr val="tx1">
                     <a:tint val="82000"/>
@@ -902,9 +902,9 @@
                 </a:solidFill>
               </a:defRPr>
             </a:lvl1pPr>
-            <a:lvl2pPr marL="900016" indent="0">
-              <a:buNone/>
-              <a:defRPr sz="3937">
+            <a:lvl2pPr marL="1079998" indent="0">
+              <a:buNone/>
+              <a:defRPr sz="4724">
                 <a:solidFill>
                   <a:schemeClr val="tx1">
                     <a:tint val="82000"/>
@@ -912,9 +912,9 @@
                 </a:solidFill>
               </a:defRPr>
             </a:lvl2pPr>
-            <a:lvl3pPr marL="1800030" indent="0">
-              <a:buNone/>
-              <a:defRPr sz="3543">
+            <a:lvl3pPr marL="2159996" indent="0">
+              <a:buNone/>
+              <a:defRPr sz="4252">
                 <a:solidFill>
                   <a:schemeClr val="tx1">
                     <a:tint val="82000"/>
@@ -922,9 +922,9 @@
                 </a:solidFill>
               </a:defRPr>
             </a:lvl3pPr>
-            <a:lvl4pPr marL="2700046" indent="0">
-              <a:buNone/>
-              <a:defRPr sz="3150">
+            <a:lvl4pPr marL="3239994" indent="0">
+              <a:buNone/>
+              <a:defRPr sz="3780">
                 <a:solidFill>
                   <a:schemeClr val="tx1">
                     <a:tint val="82000"/>
@@ -932,9 +932,9 @@
                 </a:solidFill>
               </a:defRPr>
             </a:lvl4pPr>
-            <a:lvl5pPr marL="3600062" indent="0">
-              <a:buNone/>
-              <a:defRPr sz="3150">
+            <a:lvl5pPr marL="4319991" indent="0">
+              <a:buNone/>
+              <a:defRPr sz="3780">
                 <a:solidFill>
                   <a:schemeClr val="tx1">
                     <a:tint val="82000"/>
@@ -942,9 +942,9 @@
                 </a:solidFill>
               </a:defRPr>
             </a:lvl5pPr>
-            <a:lvl6pPr marL="4500076" indent="0">
-              <a:buNone/>
-              <a:defRPr sz="3150">
+            <a:lvl6pPr marL="5399989" indent="0">
+              <a:buNone/>
+              <a:defRPr sz="3780">
                 <a:solidFill>
                   <a:schemeClr val="tx1">
                     <a:tint val="82000"/>
@@ -952,9 +952,9 @@
                 </a:solidFill>
               </a:defRPr>
             </a:lvl6pPr>
-            <a:lvl7pPr marL="5400092" indent="0">
-              <a:buNone/>
-              <a:defRPr sz="3150">
+            <a:lvl7pPr marL="6479987" indent="0">
+              <a:buNone/>
+              <a:defRPr sz="3780">
                 <a:solidFill>
                   <a:schemeClr val="tx1">
                     <a:tint val="82000"/>
@@ -962,9 +962,9 @@
                 </a:solidFill>
               </a:defRPr>
             </a:lvl7pPr>
-            <a:lvl8pPr marL="6300108" indent="0">
-              <a:buNone/>
-              <a:defRPr sz="3150">
+            <a:lvl8pPr marL="7559985" indent="0">
+              <a:buNone/>
+              <a:defRPr sz="3780">
                 <a:solidFill>
                   <a:schemeClr val="tx1">
                     <a:tint val="82000"/>
@@ -972,9 +972,9 @@
                 </a:solidFill>
               </a:defRPr>
             </a:lvl8pPr>
-            <a:lvl9pPr marL="7200122" indent="0">
-              <a:buNone/>
-              <a:defRPr sz="3150">
+            <a:lvl9pPr marL="8639983" indent="0">
+              <a:buNone/>
+              <a:defRPr sz="3780">
                 <a:solidFill>
                   <a:schemeClr val="tx1">
                     <a:tint val="82000"/>
@@ -1060,7 +1060,7 @@
     </p:spTree>
     <p:extLst>
       <p:ext uri="{BB962C8B-B14F-4D97-AF65-F5344CB8AC3E}">
-        <p14:creationId xmlns:p14="http://schemas.microsoft.com/office/powerpoint/2010/main" val="3116910347"/>
+        <p14:creationId xmlns:p14="http://schemas.microsoft.com/office/powerpoint/2010/main" val="3680322933"/>
       </p:ext>
     </p:extLst>
   </p:cSld>
@@ -1122,8 +1122,8 @@
         </p:nvSpPr>
         <p:spPr>
           <a:xfrm>
-            <a:off x="1237545" y="4801143"/>
-            <a:ext cx="7650282" cy="11443415"/>
+            <a:off x="1484967" y="5749874"/>
+            <a:ext cx="9179798" cy="13704700"/>
           </a:xfrm>
         </p:spPr>
         <p:txBody>
@@ -1179,8 +1179,8 @@
         </p:nvSpPr>
         <p:spPr>
           <a:xfrm>
-            <a:off x="9112836" y="4801143"/>
-            <a:ext cx="7650282" cy="11443415"/>
+            <a:off x="10934760" y="5749874"/>
+            <a:ext cx="9179798" cy="13704700"/>
           </a:xfrm>
         </p:spPr>
         <p:txBody>
@@ -1292,7 +1292,7 @@
     </p:spTree>
     <p:extLst>
       <p:ext uri="{BB962C8B-B14F-4D97-AF65-F5344CB8AC3E}">
-        <p14:creationId xmlns:p14="http://schemas.microsoft.com/office/powerpoint/2010/main" val="2596490207"/>
+        <p14:creationId xmlns:p14="http://schemas.microsoft.com/office/powerpoint/2010/main" val="3642775449"/>
       </p:ext>
     </p:extLst>
   </p:cSld>
@@ -1331,8 +1331,8 @@
         </p:nvSpPr>
         <p:spPr>
           <a:xfrm>
-            <a:off x="1239890" y="960232"/>
-            <a:ext cx="15525572" cy="3486046"/>
+            <a:off x="1487781" y="1149979"/>
+            <a:ext cx="18629590" cy="4174910"/>
           </a:xfrm>
         </p:spPr>
         <p:txBody>
@@ -1359,8 +1359,8 @@
         </p:nvSpPr>
         <p:spPr>
           <a:xfrm>
-            <a:off x="1239893" y="4421228"/>
-            <a:ext cx="7615123" cy="2166775"/>
+            <a:off x="1487783" y="5294885"/>
+            <a:ext cx="9137610" cy="2594941"/>
           </a:xfrm>
         </p:spPr>
         <p:txBody>
@@ -1368,39 +1368,39 @@
           <a:lstStyle>
             <a:lvl1pPr marL="0" indent="0">
               <a:buNone/>
-              <a:defRPr sz="4725" b="1"/>
+              <a:defRPr sz="5669" b="1"/>
             </a:lvl1pPr>
-            <a:lvl2pPr marL="900016" indent="0">
-              <a:buNone/>
-              <a:defRPr sz="3937" b="1"/>
+            <a:lvl2pPr marL="1079998" indent="0">
+              <a:buNone/>
+              <a:defRPr sz="4724" b="1"/>
             </a:lvl2pPr>
-            <a:lvl3pPr marL="1800030" indent="0">
-              <a:buNone/>
-              <a:defRPr sz="3543" b="1"/>
+            <a:lvl3pPr marL="2159996" indent="0">
+              <a:buNone/>
+              <a:defRPr sz="4252" b="1"/>
             </a:lvl3pPr>
-            <a:lvl4pPr marL="2700046" indent="0">
-              <a:buNone/>
-              <a:defRPr sz="3150" b="1"/>
+            <a:lvl4pPr marL="3239994" indent="0">
+              <a:buNone/>
+              <a:defRPr sz="3780" b="1"/>
             </a:lvl4pPr>
-            <a:lvl5pPr marL="3600062" indent="0">
-              <a:buNone/>
-              <a:defRPr sz="3150" b="1"/>
+            <a:lvl5pPr marL="4319991" indent="0">
+              <a:buNone/>
+              <a:defRPr sz="3780" b="1"/>
             </a:lvl5pPr>
-            <a:lvl6pPr marL="4500076" indent="0">
-              <a:buNone/>
-              <a:defRPr sz="3150" b="1"/>
+            <a:lvl6pPr marL="5399989" indent="0">
+              <a:buNone/>
+              <a:defRPr sz="3780" b="1"/>
             </a:lvl6pPr>
-            <a:lvl7pPr marL="5400092" indent="0">
-              <a:buNone/>
-              <a:defRPr sz="3150" b="1"/>
+            <a:lvl7pPr marL="6479987" indent="0">
+              <a:buNone/>
+              <a:defRPr sz="3780" b="1"/>
             </a:lvl7pPr>
-            <a:lvl8pPr marL="6300108" indent="0">
-              <a:buNone/>
-              <a:defRPr sz="3150" b="1"/>
+            <a:lvl8pPr marL="7559985" indent="0">
+              <a:buNone/>
+              <a:defRPr sz="3780" b="1"/>
             </a:lvl8pPr>
-            <a:lvl9pPr marL="7200122" indent="0">
-              <a:buNone/>
-              <a:defRPr sz="3150" b="1"/>
+            <a:lvl9pPr marL="8639983" indent="0">
+              <a:buNone/>
+              <a:defRPr sz="3780" b="1"/>
             </a:lvl9pPr>
           </a:lstStyle>
           <a:p>
@@ -1424,8 +1424,8 @@
         </p:nvSpPr>
         <p:spPr>
           <a:xfrm>
-            <a:off x="1239893" y="6588002"/>
-            <a:ext cx="7615123" cy="9689955"/>
+            <a:off x="1487783" y="7889827"/>
+            <a:ext cx="9137610" cy="11604746"/>
           </a:xfrm>
         </p:spPr>
         <p:txBody>
@@ -1481,8 +1481,8 @@
         </p:nvSpPr>
         <p:spPr>
           <a:xfrm>
-            <a:off x="9112838" y="4421228"/>
-            <a:ext cx="7652626" cy="2166775"/>
+            <a:off x="10934761" y="5294885"/>
+            <a:ext cx="9182611" cy="2594941"/>
           </a:xfrm>
         </p:spPr>
         <p:txBody>
@@ -1490,39 +1490,39 @@
           <a:lstStyle>
             <a:lvl1pPr marL="0" indent="0">
               <a:buNone/>
-              <a:defRPr sz="4725" b="1"/>
+              <a:defRPr sz="5669" b="1"/>
             </a:lvl1pPr>
-            <a:lvl2pPr marL="900016" indent="0">
-              <a:buNone/>
-              <a:defRPr sz="3937" b="1"/>
+            <a:lvl2pPr marL="1079998" indent="0">
+              <a:buNone/>
+              <a:defRPr sz="4724" b="1"/>
             </a:lvl2pPr>
-            <a:lvl3pPr marL="1800030" indent="0">
-              <a:buNone/>
-              <a:defRPr sz="3543" b="1"/>
+            <a:lvl3pPr marL="2159996" indent="0">
+              <a:buNone/>
+              <a:defRPr sz="4252" b="1"/>
             </a:lvl3pPr>
-            <a:lvl4pPr marL="2700046" indent="0">
-              <a:buNone/>
-              <a:defRPr sz="3150" b="1"/>
+            <a:lvl4pPr marL="3239994" indent="0">
+              <a:buNone/>
+              <a:defRPr sz="3780" b="1"/>
             </a:lvl4pPr>
-            <a:lvl5pPr marL="3600062" indent="0">
-              <a:buNone/>
-              <a:defRPr sz="3150" b="1"/>
+            <a:lvl5pPr marL="4319991" indent="0">
+              <a:buNone/>
+              <a:defRPr sz="3780" b="1"/>
             </a:lvl5pPr>
-            <a:lvl6pPr marL="4500076" indent="0">
-              <a:buNone/>
-              <a:defRPr sz="3150" b="1"/>
+            <a:lvl6pPr marL="5399989" indent="0">
+              <a:buNone/>
+              <a:defRPr sz="3780" b="1"/>
             </a:lvl6pPr>
-            <a:lvl7pPr marL="5400092" indent="0">
-              <a:buNone/>
-              <a:defRPr sz="3150" b="1"/>
+            <a:lvl7pPr marL="6479987" indent="0">
+              <a:buNone/>
+              <a:defRPr sz="3780" b="1"/>
             </a:lvl7pPr>
-            <a:lvl8pPr marL="6300108" indent="0">
-              <a:buNone/>
-              <a:defRPr sz="3150" b="1"/>
+            <a:lvl8pPr marL="7559985" indent="0">
+              <a:buNone/>
+              <a:defRPr sz="3780" b="1"/>
             </a:lvl8pPr>
-            <a:lvl9pPr marL="7200122" indent="0">
-              <a:buNone/>
-              <a:defRPr sz="3150" b="1"/>
+            <a:lvl9pPr marL="8639983" indent="0">
+              <a:buNone/>
+              <a:defRPr sz="3780" b="1"/>
             </a:lvl9pPr>
           </a:lstStyle>
           <a:p>
@@ -1546,8 +1546,8 @@
         </p:nvSpPr>
         <p:spPr>
           <a:xfrm>
-            <a:off x="9112838" y="6588002"/>
-            <a:ext cx="7652626" cy="9689955"/>
+            <a:off x="10934761" y="7889827"/>
+            <a:ext cx="9182611" cy="11604746"/>
           </a:xfrm>
         </p:spPr>
         <p:txBody>
@@ -1659,7 +1659,7 @@
     </p:spTree>
     <p:extLst>
       <p:ext uri="{BB962C8B-B14F-4D97-AF65-F5344CB8AC3E}">
-        <p14:creationId xmlns:p14="http://schemas.microsoft.com/office/powerpoint/2010/main" val="4251961896"/>
+        <p14:creationId xmlns:p14="http://schemas.microsoft.com/office/powerpoint/2010/main" val="3249154135"/>
       </p:ext>
     </p:extLst>
   </p:cSld>
@@ -1777,7 +1777,7 @@
     </p:spTree>
     <p:extLst>
       <p:ext uri="{BB962C8B-B14F-4D97-AF65-F5344CB8AC3E}">
-        <p14:creationId xmlns:p14="http://schemas.microsoft.com/office/powerpoint/2010/main" val="3730769201"/>
+        <p14:creationId xmlns:p14="http://schemas.microsoft.com/office/powerpoint/2010/main" val="1467246767"/>
       </p:ext>
     </p:extLst>
   </p:cSld>
@@ -1872,7 +1872,7 @@
     </p:spTree>
     <p:extLst>
       <p:ext uri="{BB962C8B-B14F-4D97-AF65-F5344CB8AC3E}">
-        <p14:creationId xmlns:p14="http://schemas.microsoft.com/office/powerpoint/2010/main" val="1010615724"/>
+        <p14:creationId xmlns:p14="http://schemas.microsoft.com/office/powerpoint/2010/main" val="2928803198"/>
       </p:ext>
     </p:extLst>
   </p:cSld>
@@ -1911,15 +1911,15 @@
         </p:nvSpPr>
         <p:spPr>
           <a:xfrm>
-            <a:off x="1239892" y="1202372"/>
-            <a:ext cx="5805682" cy="4208304"/>
+            <a:off x="1487781" y="1439968"/>
+            <a:ext cx="6966409" cy="5039889"/>
           </a:xfrm>
         </p:spPr>
         <p:txBody>
           <a:bodyPr anchor="b"/>
           <a:lstStyle>
             <a:lvl1pPr>
-              <a:defRPr sz="6299"/>
+              <a:defRPr sz="7559"/>
             </a:lvl1pPr>
           </a:lstStyle>
           <a:p>
@@ -1943,39 +1943,39 @@
         </p:nvSpPr>
         <p:spPr>
           <a:xfrm>
-            <a:off x="7652626" y="2596797"/>
-            <a:ext cx="9112836" cy="12816957"/>
+            <a:off x="9182611" y="3109937"/>
+            <a:ext cx="10934760" cy="15349662"/>
           </a:xfrm>
         </p:spPr>
         <p:txBody>
           <a:bodyPr/>
           <a:lstStyle>
             <a:lvl1pPr>
-              <a:defRPr sz="6299"/>
+              <a:defRPr sz="7559"/>
             </a:lvl1pPr>
             <a:lvl2pPr>
-              <a:defRPr sz="5512"/>
+              <a:defRPr sz="6614"/>
             </a:lvl2pPr>
             <a:lvl3pPr>
-              <a:defRPr sz="4725"/>
+              <a:defRPr sz="5669"/>
             </a:lvl3pPr>
             <a:lvl4pPr>
-              <a:defRPr sz="3937"/>
+              <a:defRPr sz="4724"/>
             </a:lvl4pPr>
             <a:lvl5pPr>
-              <a:defRPr sz="3937"/>
+              <a:defRPr sz="4724"/>
             </a:lvl5pPr>
             <a:lvl6pPr>
-              <a:defRPr sz="3937"/>
+              <a:defRPr sz="4724"/>
             </a:lvl6pPr>
             <a:lvl7pPr>
-              <a:defRPr sz="3937"/>
+              <a:defRPr sz="4724"/>
             </a:lvl7pPr>
             <a:lvl8pPr>
-              <a:defRPr sz="3937"/>
+              <a:defRPr sz="4724"/>
             </a:lvl8pPr>
             <a:lvl9pPr>
-              <a:defRPr sz="3937"/>
+              <a:defRPr sz="4724"/>
             </a:lvl9pPr>
           </a:lstStyle>
           <a:p>
@@ -2028,8 +2028,8 @@
         </p:nvSpPr>
         <p:spPr>
           <a:xfrm>
-            <a:off x="1239892" y="5410677"/>
-            <a:ext cx="5805682" cy="10023947"/>
+            <a:off x="1487781" y="6479857"/>
+            <a:ext cx="6966409" cy="12004738"/>
           </a:xfrm>
         </p:spPr>
         <p:txBody>
@@ -2037,39 +2037,39 @@
           <a:lstStyle>
             <a:lvl1pPr marL="0" indent="0">
               <a:buNone/>
-              <a:defRPr sz="3150"/>
+              <a:defRPr sz="3780"/>
             </a:lvl1pPr>
-            <a:lvl2pPr marL="900016" indent="0">
-              <a:buNone/>
-              <a:defRPr sz="2756"/>
+            <a:lvl2pPr marL="1079998" indent="0">
+              <a:buNone/>
+              <a:defRPr sz="3307"/>
             </a:lvl2pPr>
-            <a:lvl3pPr marL="1800030" indent="0">
+            <a:lvl3pPr marL="2159996" indent="0">
+              <a:buNone/>
+              <a:defRPr sz="2835"/>
+            </a:lvl3pPr>
+            <a:lvl4pPr marL="3239994" indent="0">
               <a:buNone/>
               <a:defRPr sz="2362"/>
-            </a:lvl3pPr>
-            <a:lvl4pPr marL="2700046" indent="0">
-              <a:buNone/>
-              <a:defRPr sz="1969"/>
             </a:lvl4pPr>
-            <a:lvl5pPr marL="3600062" indent="0">
-              <a:buNone/>
-              <a:defRPr sz="1969"/>
+            <a:lvl5pPr marL="4319991" indent="0">
+              <a:buNone/>
+              <a:defRPr sz="2362"/>
             </a:lvl5pPr>
-            <a:lvl6pPr marL="4500076" indent="0">
-              <a:buNone/>
-              <a:defRPr sz="1969"/>
+            <a:lvl6pPr marL="5399989" indent="0">
+              <a:buNone/>
+              <a:defRPr sz="2362"/>
             </a:lvl6pPr>
-            <a:lvl7pPr marL="5400092" indent="0">
-              <a:buNone/>
-              <a:defRPr sz="1969"/>
+            <a:lvl7pPr marL="6479987" indent="0">
+              <a:buNone/>
+              <a:defRPr sz="2362"/>
             </a:lvl7pPr>
-            <a:lvl8pPr marL="6300108" indent="0">
-              <a:buNone/>
-              <a:defRPr sz="1969"/>
+            <a:lvl8pPr marL="7559985" indent="0">
+              <a:buNone/>
+              <a:defRPr sz="2362"/>
             </a:lvl8pPr>
-            <a:lvl9pPr marL="7200122" indent="0">
-              <a:buNone/>
-              <a:defRPr sz="1969"/>
+            <a:lvl9pPr marL="8639983" indent="0">
+              <a:buNone/>
+              <a:defRPr sz="2362"/>
             </a:lvl9pPr>
           </a:lstStyle>
           <a:p>
@@ -2149,7 +2149,7 @@
     </p:spTree>
     <p:extLst>
       <p:ext uri="{BB962C8B-B14F-4D97-AF65-F5344CB8AC3E}">
-        <p14:creationId xmlns:p14="http://schemas.microsoft.com/office/powerpoint/2010/main" val="4047683623"/>
+        <p14:creationId xmlns:p14="http://schemas.microsoft.com/office/powerpoint/2010/main" val="2349480880"/>
       </p:ext>
     </p:extLst>
   </p:cSld>
@@ -2188,15 +2188,15 @@
         </p:nvSpPr>
         <p:spPr>
           <a:xfrm>
-            <a:off x="1239892" y="1202372"/>
-            <a:ext cx="5805682" cy="4208304"/>
+            <a:off x="1487781" y="1439968"/>
+            <a:ext cx="6966409" cy="5039889"/>
           </a:xfrm>
         </p:spPr>
         <p:txBody>
           <a:bodyPr anchor="b"/>
           <a:lstStyle>
             <a:lvl1pPr>
-              <a:defRPr sz="6299"/>
+              <a:defRPr sz="7559"/>
             </a:lvl1pPr>
           </a:lstStyle>
           <a:p>
@@ -2220,8 +2220,8 @@
         </p:nvSpPr>
         <p:spPr>
           <a:xfrm>
-            <a:off x="7652626" y="2596797"/>
-            <a:ext cx="9112836" cy="12816957"/>
+            <a:off x="9182611" y="3109937"/>
+            <a:ext cx="10934760" cy="15349662"/>
           </a:xfrm>
         </p:spPr>
         <p:txBody>
@@ -2229,39 +2229,39 @@
           <a:lstStyle>
             <a:lvl1pPr marL="0" indent="0">
               <a:buNone/>
-              <a:defRPr sz="6299"/>
+              <a:defRPr sz="7559"/>
             </a:lvl1pPr>
-            <a:lvl2pPr marL="900016" indent="0">
-              <a:buNone/>
-              <a:defRPr sz="5512"/>
+            <a:lvl2pPr marL="1079998" indent="0">
+              <a:buNone/>
+              <a:defRPr sz="6614"/>
             </a:lvl2pPr>
-            <a:lvl3pPr marL="1800030" indent="0">
-              <a:buNone/>
-              <a:defRPr sz="4725"/>
+            <a:lvl3pPr marL="2159996" indent="0">
+              <a:buNone/>
+              <a:defRPr sz="5669"/>
             </a:lvl3pPr>
-            <a:lvl4pPr marL="2700046" indent="0">
-              <a:buNone/>
-              <a:defRPr sz="3937"/>
+            <a:lvl4pPr marL="3239994" indent="0">
+              <a:buNone/>
+              <a:defRPr sz="4724"/>
             </a:lvl4pPr>
-            <a:lvl5pPr marL="3600062" indent="0">
-              <a:buNone/>
-              <a:defRPr sz="3937"/>
+            <a:lvl5pPr marL="4319991" indent="0">
+              <a:buNone/>
+              <a:defRPr sz="4724"/>
             </a:lvl5pPr>
-            <a:lvl6pPr marL="4500076" indent="0">
-              <a:buNone/>
-              <a:defRPr sz="3937"/>
+            <a:lvl6pPr marL="5399989" indent="0">
+              <a:buNone/>
+              <a:defRPr sz="4724"/>
             </a:lvl6pPr>
-            <a:lvl7pPr marL="5400092" indent="0">
-              <a:buNone/>
-              <a:defRPr sz="3937"/>
+            <a:lvl7pPr marL="6479987" indent="0">
+              <a:buNone/>
+              <a:defRPr sz="4724"/>
             </a:lvl7pPr>
-            <a:lvl8pPr marL="6300108" indent="0">
-              <a:buNone/>
-              <a:defRPr sz="3937"/>
+            <a:lvl8pPr marL="7559985" indent="0">
+              <a:buNone/>
+              <a:defRPr sz="4724"/>
             </a:lvl8pPr>
-            <a:lvl9pPr marL="7200122" indent="0">
-              <a:buNone/>
-              <a:defRPr sz="3937"/>
+            <a:lvl9pPr marL="8639983" indent="0">
+              <a:buNone/>
+              <a:defRPr sz="4724"/>
             </a:lvl9pPr>
           </a:lstStyle>
           <a:p>
@@ -2285,8 +2285,8 @@
         </p:nvSpPr>
         <p:spPr>
           <a:xfrm>
-            <a:off x="1239892" y="5410677"/>
-            <a:ext cx="5805682" cy="10023947"/>
+            <a:off x="1487781" y="6479857"/>
+            <a:ext cx="6966409" cy="12004738"/>
           </a:xfrm>
         </p:spPr>
         <p:txBody>
@@ -2294,39 +2294,39 @@
           <a:lstStyle>
             <a:lvl1pPr marL="0" indent="0">
               <a:buNone/>
-              <a:defRPr sz="3150"/>
+              <a:defRPr sz="3780"/>
             </a:lvl1pPr>
-            <a:lvl2pPr marL="900016" indent="0">
-              <a:buNone/>
-              <a:defRPr sz="2756"/>
+            <a:lvl2pPr marL="1079998" indent="0">
+              <a:buNone/>
+              <a:defRPr sz="3307"/>
             </a:lvl2pPr>
-            <a:lvl3pPr marL="1800030" indent="0">
+            <a:lvl3pPr marL="2159996" indent="0">
+              <a:buNone/>
+              <a:defRPr sz="2835"/>
+            </a:lvl3pPr>
+            <a:lvl4pPr marL="3239994" indent="0">
               <a:buNone/>
               <a:defRPr sz="2362"/>
-            </a:lvl3pPr>
-            <a:lvl4pPr marL="2700046" indent="0">
-              <a:buNone/>
-              <a:defRPr sz="1969"/>
             </a:lvl4pPr>
-            <a:lvl5pPr marL="3600062" indent="0">
-              <a:buNone/>
-              <a:defRPr sz="1969"/>
+            <a:lvl5pPr marL="4319991" indent="0">
+              <a:buNone/>
+              <a:defRPr sz="2362"/>
             </a:lvl5pPr>
-            <a:lvl6pPr marL="4500076" indent="0">
-              <a:buNone/>
-              <a:defRPr sz="1969"/>
+            <a:lvl6pPr marL="5399989" indent="0">
+              <a:buNone/>
+              <a:defRPr sz="2362"/>
             </a:lvl6pPr>
-            <a:lvl7pPr marL="5400092" indent="0">
-              <a:buNone/>
-              <a:defRPr sz="1969"/>
+            <a:lvl7pPr marL="6479987" indent="0">
+              <a:buNone/>
+              <a:defRPr sz="2362"/>
             </a:lvl7pPr>
-            <a:lvl8pPr marL="6300108" indent="0">
-              <a:buNone/>
-              <a:defRPr sz="1969"/>
+            <a:lvl8pPr marL="7559985" indent="0">
+              <a:buNone/>
+              <a:defRPr sz="2362"/>
             </a:lvl8pPr>
-            <a:lvl9pPr marL="7200122" indent="0">
-              <a:buNone/>
-              <a:defRPr sz="1969"/>
+            <a:lvl9pPr marL="8639983" indent="0">
+              <a:buNone/>
+              <a:defRPr sz="2362"/>
             </a:lvl9pPr>
           </a:lstStyle>
           <a:p>
@@ -2406,7 +2406,7 @@
     </p:spTree>
     <p:extLst>
       <p:ext uri="{BB962C8B-B14F-4D97-AF65-F5344CB8AC3E}">
-        <p14:creationId xmlns:p14="http://schemas.microsoft.com/office/powerpoint/2010/main" val="1425984561"/>
+        <p14:creationId xmlns:p14="http://schemas.microsoft.com/office/powerpoint/2010/main" val="1035716959"/>
       </p:ext>
     </p:extLst>
   </p:cSld>
@@ -2450,8 +2450,8 @@
         </p:nvSpPr>
         <p:spPr>
           <a:xfrm>
-            <a:off x="1237546" y="960232"/>
-            <a:ext cx="15525572" cy="3486046"/>
+            <a:off x="1484968" y="1149979"/>
+            <a:ext cx="18629590" cy="4174910"/>
           </a:xfrm>
           <a:prstGeom prst="rect">
             <a:avLst/>
@@ -2483,8 +2483,8 @@
         </p:nvSpPr>
         <p:spPr>
           <a:xfrm>
-            <a:off x="1237546" y="4801143"/>
-            <a:ext cx="15525572" cy="11443415"/>
+            <a:off x="1484968" y="5749874"/>
+            <a:ext cx="18629590" cy="13704700"/>
           </a:xfrm>
           <a:prstGeom prst="rect">
             <a:avLst/>
@@ -2545,8 +2545,8 @@
         </p:nvSpPr>
         <p:spPr>
           <a:xfrm>
-            <a:off x="1237546" y="16716325"/>
-            <a:ext cx="4050149" cy="960228"/>
+            <a:off x="1484967" y="20019564"/>
+            <a:ext cx="4859893" cy="1149975"/>
           </a:xfrm>
           <a:prstGeom prst="rect">
             <a:avLst/>
@@ -2556,7 +2556,7 @@
           <a:bodyPr vert="horz" lIns="91440" tIns="45720" rIns="91440" bIns="45720" rtlCol="0" anchor="ctr"/>
           <a:lstStyle>
             <a:lvl1pPr algn="l">
-              <a:defRPr sz="2362">
+              <a:defRPr sz="2835">
                 <a:solidFill>
                   <a:schemeClr val="tx1">
                     <a:tint val="82000"/>
@@ -2586,8 +2586,8 @@
         </p:nvSpPr>
         <p:spPr>
           <a:xfrm>
-            <a:off x="5962720" y="16716325"/>
-            <a:ext cx="6075224" cy="960228"/>
+            <a:off x="7154843" y="20019564"/>
+            <a:ext cx="7289840" cy="1149975"/>
           </a:xfrm>
           <a:prstGeom prst="rect">
             <a:avLst/>
@@ -2597,7 +2597,7 @@
           <a:bodyPr vert="horz" lIns="91440" tIns="45720" rIns="91440" bIns="45720" rtlCol="0" anchor="ctr"/>
           <a:lstStyle>
             <a:lvl1pPr algn="ctr">
-              <a:defRPr sz="2362">
+              <a:defRPr sz="2835">
                 <a:solidFill>
                   <a:schemeClr val="tx1">
                     <a:tint val="82000"/>
@@ -2623,8 +2623,8 @@
         </p:nvSpPr>
         <p:spPr>
           <a:xfrm>
-            <a:off x="12712968" y="16716325"/>
-            <a:ext cx="4050149" cy="960228"/>
+            <a:off x="15254665" y="20019564"/>
+            <a:ext cx="4859893" cy="1149975"/>
           </a:xfrm>
           <a:prstGeom prst="rect">
             <a:avLst/>
@@ -2634,7 +2634,7 @@
           <a:bodyPr vert="horz" lIns="91440" tIns="45720" rIns="91440" bIns="45720" rtlCol="0" anchor="ctr"/>
           <a:lstStyle>
             <a:lvl1pPr algn="r">
-              <a:defRPr sz="2362">
+              <a:defRPr sz="2835">
                 <a:solidFill>
                   <a:schemeClr val="tx1">
                     <a:tint val="82000"/>
@@ -2655,27 +2655,27 @@
     </p:spTree>
     <p:extLst>
       <p:ext uri="{BB962C8B-B14F-4D97-AF65-F5344CB8AC3E}">
-        <p14:creationId xmlns:p14="http://schemas.microsoft.com/office/powerpoint/2010/main" val="294525848"/>
+        <p14:creationId xmlns:p14="http://schemas.microsoft.com/office/powerpoint/2010/main" val="1106261749"/>
       </p:ext>
     </p:extLst>
   </p:cSld>
   <p:clrMap bg1="lt1" tx1="dk1" bg2="lt2" tx2="dk2" accent1="accent1" accent2="accent2" accent3="accent3" accent4="accent4" accent5="accent5" accent6="accent6" hlink="hlink" folHlink="folHlink"/>
   <p:sldLayoutIdLst>
-    <p:sldLayoutId id="2147483661" r:id="rId1"/>
-    <p:sldLayoutId id="2147483662" r:id="rId2"/>
-    <p:sldLayoutId id="2147483663" r:id="rId3"/>
-    <p:sldLayoutId id="2147483664" r:id="rId4"/>
-    <p:sldLayoutId id="2147483665" r:id="rId5"/>
-    <p:sldLayoutId id="2147483666" r:id="rId6"/>
-    <p:sldLayoutId id="2147483667" r:id="rId7"/>
-    <p:sldLayoutId id="2147483668" r:id="rId8"/>
-    <p:sldLayoutId id="2147483669" r:id="rId9"/>
-    <p:sldLayoutId id="2147483670" r:id="rId10"/>
-    <p:sldLayoutId id="2147483671" r:id="rId11"/>
+    <p:sldLayoutId id="2147483697" r:id="rId1"/>
+    <p:sldLayoutId id="2147483698" r:id="rId2"/>
+    <p:sldLayoutId id="2147483699" r:id="rId3"/>
+    <p:sldLayoutId id="2147483700" r:id="rId4"/>
+    <p:sldLayoutId id="2147483701" r:id="rId5"/>
+    <p:sldLayoutId id="2147483702" r:id="rId6"/>
+    <p:sldLayoutId id="2147483703" r:id="rId7"/>
+    <p:sldLayoutId id="2147483704" r:id="rId8"/>
+    <p:sldLayoutId id="2147483705" r:id="rId9"/>
+    <p:sldLayoutId id="2147483706" r:id="rId10"/>
+    <p:sldLayoutId id="2147483707" r:id="rId11"/>
   </p:sldLayoutIdLst>
   <p:txStyles>
     <p:titleStyle>
-      <a:lvl1pPr algn="l" defTabSz="1800030" rtl="0" eaLnBrk="1" latinLnBrk="0" hangingPunct="1">
+      <a:lvl1pPr algn="l" defTabSz="2159996" rtl="0" eaLnBrk="1" latinLnBrk="0" hangingPunct="1">
         <a:lnSpc>
           <a:spcPct val="90000"/>
         </a:lnSpc>
@@ -2683,7 +2683,7 @@
           <a:spcPct val="0"/>
         </a:spcBef>
         <a:buNone/>
-        <a:defRPr sz="8661" kern="1200">
+        <a:defRPr sz="10394" kern="1200">
           <a:solidFill>
             <a:schemeClr val="tx1"/>
           </a:solidFill>
@@ -2694,16 +2694,16 @@
       </a:lvl1pPr>
     </p:titleStyle>
     <p:bodyStyle>
-      <a:lvl1pPr marL="450007" indent="-450007" algn="l" defTabSz="1800030" rtl="0" eaLnBrk="1" latinLnBrk="0" hangingPunct="1">
+      <a:lvl1pPr marL="539999" indent="-539999" algn="l" defTabSz="2159996" rtl="0" eaLnBrk="1" latinLnBrk="0" hangingPunct="1">
         <a:lnSpc>
           <a:spcPct val="90000"/>
         </a:lnSpc>
         <a:spcBef>
-          <a:spcPts val="1969"/>
+          <a:spcPts val="2362"/>
         </a:spcBef>
         <a:buFont typeface="Arial" panose="020B0604020202020204" pitchFamily="34" charset="0"/>
         <a:buChar char="•"/>
-        <a:defRPr sz="5512" kern="1200">
+        <a:defRPr sz="6614" kern="1200">
           <a:solidFill>
             <a:schemeClr val="tx1"/>
           </a:solidFill>
@@ -2712,16 +2712,16 @@
           <a:cs typeface="+mn-cs"/>
         </a:defRPr>
       </a:lvl1pPr>
-      <a:lvl2pPr marL="1350023" indent="-450007" algn="l" defTabSz="1800030" rtl="0" eaLnBrk="1" latinLnBrk="0" hangingPunct="1">
+      <a:lvl2pPr marL="1619997" indent="-539999" algn="l" defTabSz="2159996" rtl="0" eaLnBrk="1" latinLnBrk="0" hangingPunct="1">
         <a:lnSpc>
           <a:spcPct val="90000"/>
         </a:lnSpc>
         <a:spcBef>
-          <a:spcPts val="984"/>
+          <a:spcPts val="1181"/>
         </a:spcBef>
         <a:buFont typeface="Arial" panose="020B0604020202020204" pitchFamily="34" charset="0"/>
         <a:buChar char="•"/>
-        <a:defRPr sz="4725" kern="1200">
+        <a:defRPr sz="5669" kern="1200">
           <a:solidFill>
             <a:schemeClr val="tx1"/>
           </a:solidFill>
@@ -2730,16 +2730,16 @@
           <a:cs typeface="+mn-cs"/>
         </a:defRPr>
       </a:lvl2pPr>
-      <a:lvl3pPr marL="2250039" indent="-450007" algn="l" defTabSz="1800030" rtl="0" eaLnBrk="1" latinLnBrk="0" hangingPunct="1">
+      <a:lvl3pPr marL="2699995" indent="-539999" algn="l" defTabSz="2159996" rtl="0" eaLnBrk="1" latinLnBrk="0" hangingPunct="1">
         <a:lnSpc>
           <a:spcPct val="90000"/>
         </a:lnSpc>
         <a:spcBef>
-          <a:spcPts val="984"/>
+          <a:spcPts val="1181"/>
         </a:spcBef>
         <a:buFont typeface="Arial" panose="020B0604020202020204" pitchFamily="34" charset="0"/>
         <a:buChar char="•"/>
-        <a:defRPr sz="3937" kern="1200">
+        <a:defRPr sz="4724" kern="1200">
           <a:solidFill>
             <a:schemeClr val="tx1"/>
           </a:solidFill>
@@ -2748,16 +2748,16 @@
           <a:cs typeface="+mn-cs"/>
         </a:defRPr>
       </a:lvl3pPr>
-      <a:lvl4pPr marL="3150053" indent="-450007" algn="l" defTabSz="1800030" rtl="0" eaLnBrk="1" latinLnBrk="0" hangingPunct="1">
+      <a:lvl4pPr marL="3779992" indent="-539999" algn="l" defTabSz="2159996" rtl="0" eaLnBrk="1" latinLnBrk="0" hangingPunct="1">
         <a:lnSpc>
           <a:spcPct val="90000"/>
         </a:lnSpc>
         <a:spcBef>
-          <a:spcPts val="984"/>
+          <a:spcPts val="1181"/>
         </a:spcBef>
         <a:buFont typeface="Arial" panose="020B0604020202020204" pitchFamily="34" charset="0"/>
         <a:buChar char="•"/>
-        <a:defRPr sz="3543" kern="1200">
+        <a:defRPr sz="4252" kern="1200">
           <a:solidFill>
             <a:schemeClr val="tx1"/>
           </a:solidFill>
@@ -2766,16 +2766,16 @@
           <a:cs typeface="+mn-cs"/>
         </a:defRPr>
       </a:lvl4pPr>
-      <a:lvl5pPr marL="4050069" indent="-450007" algn="l" defTabSz="1800030" rtl="0" eaLnBrk="1" latinLnBrk="0" hangingPunct="1">
+      <a:lvl5pPr marL="4859990" indent="-539999" algn="l" defTabSz="2159996" rtl="0" eaLnBrk="1" latinLnBrk="0" hangingPunct="1">
         <a:lnSpc>
           <a:spcPct val="90000"/>
         </a:lnSpc>
         <a:spcBef>
-          <a:spcPts val="984"/>
+          <a:spcPts val="1181"/>
         </a:spcBef>
         <a:buFont typeface="Arial" panose="020B0604020202020204" pitchFamily="34" charset="0"/>
         <a:buChar char="•"/>
-        <a:defRPr sz="3543" kern="1200">
+        <a:defRPr sz="4252" kern="1200">
           <a:solidFill>
             <a:schemeClr val="tx1"/>
           </a:solidFill>
@@ -2784,16 +2784,16 @@
           <a:cs typeface="+mn-cs"/>
         </a:defRPr>
       </a:lvl5pPr>
-      <a:lvl6pPr marL="4950085" indent="-450007" algn="l" defTabSz="1800030" rtl="0" eaLnBrk="1" latinLnBrk="0" hangingPunct="1">
+      <a:lvl6pPr marL="5939988" indent="-539999" algn="l" defTabSz="2159996" rtl="0" eaLnBrk="1" latinLnBrk="0" hangingPunct="1">
         <a:lnSpc>
           <a:spcPct val="90000"/>
         </a:lnSpc>
         <a:spcBef>
-          <a:spcPts val="984"/>
+          <a:spcPts val="1181"/>
         </a:spcBef>
         <a:buFont typeface="Arial" panose="020B0604020202020204" pitchFamily="34" charset="0"/>
         <a:buChar char="•"/>
-        <a:defRPr sz="3543" kern="1200">
+        <a:defRPr sz="4252" kern="1200">
           <a:solidFill>
             <a:schemeClr val="tx1"/>
           </a:solidFill>
@@ -2802,16 +2802,16 @@
           <a:cs typeface="+mn-cs"/>
         </a:defRPr>
       </a:lvl6pPr>
-      <a:lvl7pPr marL="5850099" indent="-450007" algn="l" defTabSz="1800030" rtl="0" eaLnBrk="1" latinLnBrk="0" hangingPunct="1">
+      <a:lvl7pPr marL="7019986" indent="-539999" algn="l" defTabSz="2159996" rtl="0" eaLnBrk="1" latinLnBrk="0" hangingPunct="1">
         <a:lnSpc>
           <a:spcPct val="90000"/>
         </a:lnSpc>
         <a:spcBef>
-          <a:spcPts val="984"/>
+          <a:spcPts val="1181"/>
         </a:spcBef>
         <a:buFont typeface="Arial" panose="020B0604020202020204" pitchFamily="34" charset="0"/>
         <a:buChar char="•"/>
-        <a:defRPr sz="3543" kern="1200">
+        <a:defRPr sz="4252" kern="1200">
           <a:solidFill>
             <a:schemeClr val="tx1"/>
           </a:solidFill>
@@ -2820,16 +2820,16 @@
           <a:cs typeface="+mn-cs"/>
         </a:defRPr>
       </a:lvl7pPr>
-      <a:lvl8pPr marL="6750115" indent="-450007" algn="l" defTabSz="1800030" rtl="0" eaLnBrk="1" latinLnBrk="0" hangingPunct="1">
+      <a:lvl8pPr marL="8099984" indent="-539999" algn="l" defTabSz="2159996" rtl="0" eaLnBrk="1" latinLnBrk="0" hangingPunct="1">
         <a:lnSpc>
           <a:spcPct val="90000"/>
         </a:lnSpc>
         <a:spcBef>
-          <a:spcPts val="984"/>
+          <a:spcPts val="1181"/>
         </a:spcBef>
         <a:buFont typeface="Arial" panose="020B0604020202020204" pitchFamily="34" charset="0"/>
         <a:buChar char="•"/>
-        <a:defRPr sz="3543" kern="1200">
+        <a:defRPr sz="4252" kern="1200">
           <a:solidFill>
             <a:schemeClr val="tx1"/>
           </a:solidFill>
@@ -2838,16 +2838,16 @@
           <a:cs typeface="+mn-cs"/>
         </a:defRPr>
       </a:lvl8pPr>
-      <a:lvl9pPr marL="7650131" indent="-450007" algn="l" defTabSz="1800030" rtl="0" eaLnBrk="1" latinLnBrk="0" hangingPunct="1">
+      <a:lvl9pPr marL="9179982" indent="-539999" algn="l" defTabSz="2159996" rtl="0" eaLnBrk="1" latinLnBrk="0" hangingPunct="1">
         <a:lnSpc>
           <a:spcPct val="90000"/>
         </a:lnSpc>
         <a:spcBef>
-          <a:spcPts val="984"/>
+          <a:spcPts val="1181"/>
         </a:spcBef>
         <a:buFont typeface="Arial" panose="020B0604020202020204" pitchFamily="34" charset="0"/>
         <a:buChar char="•"/>
-        <a:defRPr sz="3543" kern="1200">
+        <a:defRPr sz="4252" kern="1200">
           <a:solidFill>
             <a:schemeClr val="tx1"/>
           </a:solidFill>
@@ -2861,8 +2861,8 @@
       <a:defPPr>
         <a:defRPr lang="en-US"/>
       </a:defPPr>
-      <a:lvl1pPr marL="0" algn="l" defTabSz="1800030" rtl="0" eaLnBrk="1" latinLnBrk="0" hangingPunct="1">
-        <a:defRPr sz="3543" kern="1200">
+      <a:lvl1pPr marL="0" algn="l" defTabSz="2159996" rtl="0" eaLnBrk="1" latinLnBrk="0" hangingPunct="1">
+        <a:defRPr sz="4252" kern="1200">
           <a:solidFill>
             <a:schemeClr val="tx1"/>
           </a:solidFill>
@@ -2871,8 +2871,8 @@
           <a:cs typeface="+mn-cs"/>
         </a:defRPr>
       </a:lvl1pPr>
-      <a:lvl2pPr marL="900016" algn="l" defTabSz="1800030" rtl="0" eaLnBrk="1" latinLnBrk="0" hangingPunct="1">
-        <a:defRPr sz="3543" kern="1200">
+      <a:lvl2pPr marL="1079998" algn="l" defTabSz="2159996" rtl="0" eaLnBrk="1" latinLnBrk="0" hangingPunct="1">
+        <a:defRPr sz="4252" kern="1200">
           <a:solidFill>
             <a:schemeClr val="tx1"/>
           </a:solidFill>
@@ -2881,8 +2881,8 @@
           <a:cs typeface="+mn-cs"/>
         </a:defRPr>
       </a:lvl2pPr>
-      <a:lvl3pPr marL="1800030" algn="l" defTabSz="1800030" rtl="0" eaLnBrk="1" latinLnBrk="0" hangingPunct="1">
-        <a:defRPr sz="3543" kern="1200">
+      <a:lvl3pPr marL="2159996" algn="l" defTabSz="2159996" rtl="0" eaLnBrk="1" latinLnBrk="0" hangingPunct="1">
+        <a:defRPr sz="4252" kern="1200">
           <a:solidFill>
             <a:schemeClr val="tx1"/>
           </a:solidFill>
@@ -2891,8 +2891,8 @@
           <a:cs typeface="+mn-cs"/>
         </a:defRPr>
       </a:lvl3pPr>
-      <a:lvl4pPr marL="2700046" algn="l" defTabSz="1800030" rtl="0" eaLnBrk="1" latinLnBrk="0" hangingPunct="1">
-        <a:defRPr sz="3543" kern="1200">
+      <a:lvl4pPr marL="3239994" algn="l" defTabSz="2159996" rtl="0" eaLnBrk="1" latinLnBrk="0" hangingPunct="1">
+        <a:defRPr sz="4252" kern="1200">
           <a:solidFill>
             <a:schemeClr val="tx1"/>
           </a:solidFill>
@@ -2901,8 +2901,8 @@
           <a:cs typeface="+mn-cs"/>
         </a:defRPr>
       </a:lvl4pPr>
-      <a:lvl5pPr marL="3600062" algn="l" defTabSz="1800030" rtl="0" eaLnBrk="1" latinLnBrk="0" hangingPunct="1">
-        <a:defRPr sz="3543" kern="1200">
+      <a:lvl5pPr marL="4319991" algn="l" defTabSz="2159996" rtl="0" eaLnBrk="1" latinLnBrk="0" hangingPunct="1">
+        <a:defRPr sz="4252" kern="1200">
           <a:solidFill>
             <a:schemeClr val="tx1"/>
           </a:solidFill>
@@ -2911,8 +2911,8 @@
           <a:cs typeface="+mn-cs"/>
         </a:defRPr>
       </a:lvl5pPr>
-      <a:lvl6pPr marL="4500076" algn="l" defTabSz="1800030" rtl="0" eaLnBrk="1" latinLnBrk="0" hangingPunct="1">
-        <a:defRPr sz="3543" kern="1200">
+      <a:lvl6pPr marL="5399989" algn="l" defTabSz="2159996" rtl="0" eaLnBrk="1" latinLnBrk="0" hangingPunct="1">
+        <a:defRPr sz="4252" kern="1200">
           <a:solidFill>
             <a:schemeClr val="tx1"/>
           </a:solidFill>
@@ -2921,8 +2921,8 @@
           <a:cs typeface="+mn-cs"/>
         </a:defRPr>
       </a:lvl6pPr>
-      <a:lvl7pPr marL="5400092" algn="l" defTabSz="1800030" rtl="0" eaLnBrk="1" latinLnBrk="0" hangingPunct="1">
-        <a:defRPr sz="3543" kern="1200">
+      <a:lvl7pPr marL="6479987" algn="l" defTabSz="2159996" rtl="0" eaLnBrk="1" latinLnBrk="0" hangingPunct="1">
+        <a:defRPr sz="4252" kern="1200">
           <a:solidFill>
             <a:schemeClr val="tx1"/>
           </a:solidFill>
@@ -2931,8 +2931,8 @@
           <a:cs typeface="+mn-cs"/>
         </a:defRPr>
       </a:lvl7pPr>
-      <a:lvl8pPr marL="6300108" algn="l" defTabSz="1800030" rtl="0" eaLnBrk="1" latinLnBrk="0" hangingPunct="1">
-        <a:defRPr sz="3543" kern="1200">
+      <a:lvl8pPr marL="7559985" algn="l" defTabSz="2159996" rtl="0" eaLnBrk="1" latinLnBrk="0" hangingPunct="1">
+        <a:defRPr sz="4252" kern="1200">
           <a:solidFill>
             <a:schemeClr val="tx1"/>
           </a:solidFill>
@@ -2941,8 +2941,8 @@
           <a:cs typeface="+mn-cs"/>
         </a:defRPr>
       </a:lvl8pPr>
-      <a:lvl9pPr marL="7200122" algn="l" defTabSz="1800030" rtl="0" eaLnBrk="1" latinLnBrk="0" hangingPunct="1">
-        <a:defRPr sz="3543" kern="1200">
+      <a:lvl9pPr marL="8639983" algn="l" defTabSz="2159996" rtl="0" eaLnBrk="1" latinLnBrk="0" hangingPunct="1">
+        <a:defRPr sz="4252" kern="1200">
           <a:solidFill>
             <a:schemeClr val="tx1"/>
           </a:solidFill>
@@ -3009,8 +3009,8 @@
         </p:blipFill>
         <p:spPr>
           <a:xfrm>
-            <a:off x="1819447" y="11573922"/>
-            <a:ext cx="6775029" cy="4098893"/>
+            <a:off x="1977692" y="6821829"/>
+            <a:ext cx="7377435" cy="4463348"/>
           </a:xfrm>
           <a:prstGeom prst="rect">
             <a:avLst/>
@@ -3045,8 +3045,8 @@
         </p:blipFill>
         <p:spPr>
           <a:xfrm>
-            <a:off x="0" y="-1"/>
-            <a:ext cx="8502450" cy="6541573"/>
+            <a:off x="12282422" y="6644855"/>
+            <a:ext cx="8793767" cy="6765705"/>
           </a:xfrm>
           <a:prstGeom prst="rect">
             <a:avLst/>
@@ -3081,8 +3081,8 @@
         </p:blipFill>
         <p:spPr>
           <a:xfrm>
-            <a:off x="8859566" y="177609"/>
-            <a:ext cx="9141097" cy="2966901"/>
+            <a:off x="11551067" y="1347624"/>
+            <a:ext cx="9454296" cy="3068555"/>
           </a:xfrm>
           <a:prstGeom prst="rect">
             <a:avLst/>
@@ -3117,8 +3117,8 @@
         </p:blipFill>
         <p:spPr>
           <a:xfrm>
-            <a:off x="150725" y="6711328"/>
-            <a:ext cx="8502450" cy="4454408"/>
+            <a:off x="2058697" y="16423610"/>
+            <a:ext cx="7296430" cy="3822578"/>
           </a:xfrm>
           <a:prstGeom prst="rect">
             <a:avLst/>
@@ -3127,10 +3127,10 @@
       </p:pic>
       <p:pic>
         <p:nvPicPr>
-          <p:cNvPr id="9" name="Picture 8">
+          <p:cNvPr id="11" name="Picture 10">
             <a:extLst>
               <a:ext uri="{FF2B5EF4-FFF2-40B4-BE49-F238E27FC236}">
-                <a16:creationId xmlns:a16="http://schemas.microsoft.com/office/drawing/2014/main" id="{24BC5F5E-74E8-3BDB-2E9F-6877635D6A21}"/>
+                <a16:creationId xmlns:a16="http://schemas.microsoft.com/office/drawing/2014/main" id="{E31A2331-D9C0-0D0A-565B-45B29AD066D3}"/>
               </a:ext>
             </a:extLst>
           </p:cNvPr>
@@ -3153,8 +3153,8 @@
         </p:blipFill>
         <p:spPr>
           <a:xfrm>
-            <a:off x="8859566" y="8459939"/>
-            <a:ext cx="8990372" cy="5870279"/>
+            <a:off x="11917546" y="15938153"/>
+            <a:ext cx="8832095" cy="4793492"/>
           </a:xfrm>
           <a:prstGeom prst="rect">
             <a:avLst/>
@@ -3163,10 +3163,10 @@
       </p:pic>
       <p:pic>
         <p:nvPicPr>
-          <p:cNvPr id="11" name="Picture 10">
+          <p:cNvPr id="13" name="Picture 12">
             <a:extLst>
               <a:ext uri="{FF2B5EF4-FFF2-40B4-BE49-F238E27FC236}">
-                <a16:creationId xmlns:a16="http://schemas.microsoft.com/office/drawing/2014/main" id="{E31A2331-D9C0-0D0A-565B-45B29AD066D3}"/>
+                <a16:creationId xmlns:a16="http://schemas.microsoft.com/office/drawing/2014/main" id="{755F1285-8874-693D-4087-F36F7C92C632}"/>
               </a:ext>
             </a:extLst>
           </p:cNvPr>
@@ -3189,50 +3189,617 @@
         </p:blipFill>
         <p:spPr>
           <a:xfrm>
-            <a:off x="8365962" y="3144510"/>
-            <a:ext cx="9559338" cy="5188192"/>
+            <a:off x="956423" y="1406487"/>
+            <a:ext cx="9148085" cy="3551043"/>
           </a:xfrm>
           <a:prstGeom prst="rect">
             <a:avLst/>
           </a:prstGeom>
         </p:spPr>
       </p:pic>
-      <p:pic>
-        <p:nvPicPr>
-          <p:cNvPr id="13" name="Picture 12">
+      <p:sp>
+        <p:nvSpPr>
+          <p:cNvPr id="12" name="TextBox 11">
             <a:extLst>
               <a:ext uri="{FF2B5EF4-FFF2-40B4-BE49-F238E27FC236}">
-                <a16:creationId xmlns:a16="http://schemas.microsoft.com/office/drawing/2014/main" id="{755F1285-8874-693D-4087-F36F7C92C632}"/>
+                <a16:creationId xmlns:a16="http://schemas.microsoft.com/office/drawing/2014/main" id="{2AD8AE47-B51C-08EE-A5E3-7280FAF4601C}"/>
               </a:ext>
             </a:extLst>
           </p:cNvPr>
-          <p:cNvPicPr>
-            <a:picLocks noChangeAspect="1"/>
-          </p:cNvPicPr>
+          <p:cNvSpPr txBox="1"/>
           <p:nvPr/>
-        </p:nvPicPr>
-        <p:blipFill>
-          <a:blip r:embed="rId8">
-            <a:extLst>
-              <a:ext uri="{28A0092B-C50C-407E-A947-70E740481C1C}">
-                <a14:useLocalDpi xmlns:a14="http://schemas.microsoft.com/office/drawing/2010/main" val="0"/>
-              </a:ext>
-            </a:extLst>
-          </a:blip>
-          <a:stretch>
-            <a:fillRect/>
-          </a:stretch>
-        </p:blipFill>
-        <p:spPr>
-          <a:xfrm>
-            <a:off x="9080270" y="14484298"/>
-            <a:ext cx="8845030" cy="3433405"/>
+        </p:nvSpPr>
+        <p:spPr>
+          <a:xfrm>
+            <a:off x="1201312" y="9515233"/>
+            <a:ext cx="2408109" cy="1298817"/>
           </a:xfrm>
           <a:prstGeom prst="rect">
             <a:avLst/>
           </a:prstGeom>
-        </p:spPr>
-      </p:pic>
+          <a:noFill/>
+        </p:spPr>
+        <p:txBody>
+          <a:bodyPr wrap="square">
+            <a:spAutoFit/>
+          </a:bodyPr>
+          <a:lstStyle/>
+          <a:p>
+            <a:r>
+              <a:rPr lang="en-GB" sz="1960" dirty="0"/>
+              <a:t>Registered Member: A standard user interacting with the system.</a:t>
+            </a:r>
+          </a:p>
+        </p:txBody>
+      </p:sp>
+      <p:sp>
+        <p:nvSpPr>
+          <p:cNvPr id="15" name="TextBox 14">
+            <a:extLst>
+              <a:ext uri="{FF2B5EF4-FFF2-40B4-BE49-F238E27FC236}">
+                <a16:creationId xmlns:a16="http://schemas.microsoft.com/office/drawing/2014/main" id="{F13910B4-D219-BC0E-1158-84EEAF752501}"/>
+              </a:ext>
+            </a:extLst>
+          </p:cNvPr>
+          <p:cNvSpPr txBox="1"/>
+          <p:nvPr/>
+        </p:nvSpPr>
+        <p:spPr>
+          <a:xfrm>
+            <a:off x="7334454" y="9405138"/>
+            <a:ext cx="2961182" cy="1298817"/>
+          </a:xfrm>
+          <a:prstGeom prst="rect">
+            <a:avLst/>
+          </a:prstGeom>
+          <a:noFill/>
+        </p:spPr>
+        <p:txBody>
+          <a:bodyPr wrap="square">
+            <a:spAutoFit/>
+          </a:bodyPr>
+          <a:lstStyle/>
+          <a:p>
+            <a:r>
+              <a:rPr lang="en-GB" sz="1960" dirty="0"/>
+              <a:t>Registered Committee: A user with administrative privileges to manage content.</a:t>
+            </a:r>
+          </a:p>
+        </p:txBody>
+      </p:sp>
+      <p:sp>
+        <p:nvSpPr>
+          <p:cNvPr id="19" name="TextBox 18">
+            <a:extLst>
+              <a:ext uri="{FF2B5EF4-FFF2-40B4-BE49-F238E27FC236}">
+                <a16:creationId xmlns:a16="http://schemas.microsoft.com/office/drawing/2014/main" id="{E3251FC5-A8B9-7579-B95E-971E872BD8CA}"/>
+              </a:ext>
+            </a:extLst>
+          </p:cNvPr>
+          <p:cNvSpPr txBox="1"/>
+          <p:nvPr/>
+        </p:nvSpPr>
+        <p:spPr>
+          <a:xfrm>
+            <a:off x="246663" y="11453457"/>
+            <a:ext cx="7087790" cy="4121898"/>
+          </a:xfrm>
+          <a:prstGeom prst="rect">
+            <a:avLst/>
+          </a:prstGeom>
+          <a:noFill/>
+        </p:spPr>
+        <p:txBody>
+          <a:bodyPr wrap="square">
+            <a:spAutoFit/>
+          </a:bodyPr>
+          <a:lstStyle/>
+          <a:p>
+            <a:pPr algn="ctr"/>
+            <a:r>
+              <a:rPr lang="en-GB" sz="2182" dirty="0"/>
+              <a:t>Registered Member can:</a:t>
+            </a:r>
+            <a:br>
+              <a:rPr lang="en-GB" sz="2182" dirty="0"/>
+            </a:br>
+            <a:r>
+              <a:rPr lang="en-GB" sz="2182" dirty="0"/>
+              <a:t>Join Society: Enrols the user in a specific society.</a:t>
+            </a:r>
+          </a:p>
+          <a:p>
+            <a:pPr algn="ctr"/>
+            <a:r>
+              <a:rPr lang="en-GB" sz="2182" dirty="0"/>
+              <a:t>Like Post: Allows the user to engage with content posted on the platform.</a:t>
+            </a:r>
+          </a:p>
+          <a:p>
+            <a:pPr algn="ctr"/>
+            <a:r>
+              <a:rPr lang="en-GB" sz="2182" dirty="0"/>
+              <a:t>Sync upcoming Society events to Calendar: Exports event data to the user's personal calendar.</a:t>
+            </a:r>
+          </a:p>
+          <a:p>
+            <a:pPr algn="ctr"/>
+            <a:endParaRPr lang="en-GB" sz="2182" dirty="0"/>
+          </a:p>
+          <a:p>
+            <a:pPr algn="ctr"/>
+            <a:r>
+              <a:rPr lang="en-GB" sz="2182" dirty="0"/>
+              <a:t>Registered Committee can:</a:t>
+            </a:r>
+            <a:br>
+              <a:rPr lang="en-GB" sz="2182" dirty="0"/>
+            </a:br>
+            <a:r>
+              <a:rPr lang="en-GB" sz="2182" dirty="0"/>
+              <a:t>Create Post: Publishes announcements or updates for members to view.</a:t>
+            </a:r>
+          </a:p>
+          <a:p>
+            <a:pPr algn="ctr"/>
+            <a:r>
+              <a:rPr lang="en-GB" sz="2182" dirty="0"/>
+              <a:t>Create Event: Schedules and publishes new society activities.</a:t>
+            </a:r>
+          </a:p>
+        </p:txBody>
+      </p:sp>
+      <p:sp>
+        <p:nvSpPr>
+          <p:cNvPr id="23" name="TextBox 22">
+            <a:extLst>
+              <a:ext uri="{FF2B5EF4-FFF2-40B4-BE49-F238E27FC236}">
+                <a16:creationId xmlns:a16="http://schemas.microsoft.com/office/drawing/2014/main" id="{900C6CBA-00BA-B28D-3E08-A564B28F7896}"/>
+              </a:ext>
+            </a:extLst>
+          </p:cNvPr>
+          <p:cNvSpPr txBox="1"/>
+          <p:nvPr/>
+        </p:nvSpPr>
+        <p:spPr>
+          <a:xfrm>
+            <a:off x="7263154" y="10723000"/>
+            <a:ext cx="4287913" cy="4793492"/>
+          </a:xfrm>
+          <a:prstGeom prst="rect">
+            <a:avLst/>
+          </a:prstGeom>
+          <a:noFill/>
+        </p:spPr>
+        <p:txBody>
+          <a:bodyPr wrap="square">
+            <a:spAutoFit/>
+          </a:bodyPr>
+          <a:lstStyle/>
+          <a:p>
+            <a:r>
+              <a:rPr lang="en-GB" sz="2182" dirty="0"/>
+              <a:t>This Use Case diagram outlines the functional requirements for a society management system involving two distinct actors. Registered Members engage with the platform by joining societies, liking posts, and syncing upcoming events to their personal calendars. The Registered Committee holds administrative privileges, focusing on content generation by creating posts and scheduling new events for the society.</a:t>
+            </a:r>
+          </a:p>
+        </p:txBody>
+      </p:sp>
+      <p:sp>
+        <p:nvSpPr>
+          <p:cNvPr id="33" name="TextBox 32">
+            <a:extLst>
+              <a:ext uri="{FF2B5EF4-FFF2-40B4-BE49-F238E27FC236}">
+                <a16:creationId xmlns:a16="http://schemas.microsoft.com/office/drawing/2014/main" id="{5EBD5472-9A87-CE88-94B9-94131D5E7444}"/>
+              </a:ext>
+            </a:extLst>
+          </p:cNvPr>
+          <p:cNvSpPr txBox="1"/>
+          <p:nvPr/>
+        </p:nvSpPr>
+        <p:spPr>
+          <a:xfrm>
+            <a:off x="1163290" y="1024459"/>
+            <a:ext cx="8941218" cy="646331"/>
+          </a:xfrm>
+          <a:prstGeom prst="rect">
+            <a:avLst/>
+          </a:prstGeom>
+          <a:noFill/>
+        </p:spPr>
+        <p:txBody>
+          <a:bodyPr wrap="square">
+            <a:spAutoFit/>
+          </a:bodyPr>
+          <a:lstStyle/>
+          <a:p>
+            <a:pPr algn="ctr"/>
+            <a:r>
+              <a:rPr lang="en-GB" dirty="0">
+                <a:solidFill>
+                  <a:srgbClr val="0070C0"/>
+                </a:solidFill>
+              </a:rPr>
+              <a:t>Member Calendar Synchronization</a:t>
+            </a:r>
+          </a:p>
+          <a:p>
+            <a:pPr algn="ctr"/>
+            <a:endParaRPr lang="en-GB" dirty="0">
+              <a:solidFill>
+                <a:srgbClr val="0070C0"/>
+              </a:solidFill>
+            </a:endParaRPr>
+          </a:p>
+        </p:txBody>
+      </p:sp>
+      <p:sp>
+        <p:nvSpPr>
+          <p:cNvPr id="35" name="TextBox 34">
+            <a:extLst>
+              <a:ext uri="{FF2B5EF4-FFF2-40B4-BE49-F238E27FC236}">
+                <a16:creationId xmlns:a16="http://schemas.microsoft.com/office/drawing/2014/main" id="{9B7E18C1-1A7A-5B81-E718-1A082FBFDEBA}"/>
+              </a:ext>
+            </a:extLst>
+          </p:cNvPr>
+          <p:cNvSpPr txBox="1"/>
+          <p:nvPr/>
+        </p:nvSpPr>
+        <p:spPr>
+          <a:xfrm>
+            <a:off x="1425518" y="4963035"/>
+            <a:ext cx="8832095" cy="923330"/>
+          </a:xfrm>
+          <a:prstGeom prst="rect">
+            <a:avLst/>
+          </a:prstGeom>
+          <a:noFill/>
+        </p:spPr>
+        <p:txBody>
+          <a:bodyPr wrap="square">
+            <a:spAutoFit/>
+          </a:bodyPr>
+          <a:lstStyle/>
+          <a:p>
+            <a:pPr algn="ctr"/>
+            <a:r>
+              <a:rPr lang="en-GB" dirty="0"/>
+              <a:t>When a user clicks to sync, the system finds all future events in the database. It converts these records into a standard file format that personal calendars understand. The user then downloads this file to import the schedule into their own app.</a:t>
+            </a:r>
+          </a:p>
+        </p:txBody>
+      </p:sp>
+      <p:sp>
+        <p:nvSpPr>
+          <p:cNvPr id="39" name="TextBox 38">
+            <a:extLst>
+              <a:ext uri="{FF2B5EF4-FFF2-40B4-BE49-F238E27FC236}">
+                <a16:creationId xmlns:a16="http://schemas.microsoft.com/office/drawing/2014/main" id="{1486BE01-2EE3-0EF4-AC09-95EE136A0425}"/>
+              </a:ext>
+            </a:extLst>
+          </p:cNvPr>
+          <p:cNvSpPr txBox="1"/>
+          <p:nvPr/>
+        </p:nvSpPr>
+        <p:spPr>
+          <a:xfrm>
+            <a:off x="11917547" y="20375488"/>
+            <a:ext cx="9681978" cy="1200329"/>
+          </a:xfrm>
+          <a:prstGeom prst="rect">
+            <a:avLst/>
+          </a:prstGeom>
+          <a:noFill/>
+        </p:spPr>
+        <p:txBody>
+          <a:bodyPr wrap="square">
+            <a:spAutoFit/>
+          </a:bodyPr>
+          <a:lstStyle/>
+          <a:p>
+            <a:endParaRPr lang="en-GB" dirty="0"/>
+          </a:p>
+          <a:p>
+            <a:pPr algn="ctr"/>
+            <a:r>
+              <a:rPr lang="en-GB" dirty="0"/>
+              <a:t>The system presents a list of active societies from the database. When a user selects a group to join, the system creates a formal link between the user and that society. This action instantly grants them member access.</a:t>
+            </a:r>
+          </a:p>
+        </p:txBody>
+      </p:sp>
+      <p:sp>
+        <p:nvSpPr>
+          <p:cNvPr id="41" name="TextBox 40">
+            <a:extLst>
+              <a:ext uri="{FF2B5EF4-FFF2-40B4-BE49-F238E27FC236}">
+                <a16:creationId xmlns:a16="http://schemas.microsoft.com/office/drawing/2014/main" id="{9507F128-A7B0-7421-B9C1-B3DC1F191CB8}"/>
+              </a:ext>
+            </a:extLst>
+          </p:cNvPr>
+          <p:cNvSpPr txBox="1"/>
+          <p:nvPr/>
+        </p:nvSpPr>
+        <p:spPr>
+          <a:xfrm>
+            <a:off x="11917546" y="15478712"/>
+            <a:ext cx="8832095" cy="369332"/>
+          </a:xfrm>
+          <a:prstGeom prst="rect">
+            <a:avLst/>
+          </a:prstGeom>
+          <a:noFill/>
+        </p:spPr>
+        <p:txBody>
+          <a:bodyPr wrap="square">
+            <a:spAutoFit/>
+          </a:bodyPr>
+          <a:lstStyle>
+            <a:defPPr>
+              <a:defRPr lang="en-US"/>
+            </a:defPPr>
+            <a:lvl1pPr>
+              <a:defRPr>
+                <a:solidFill>
+                  <a:srgbClr val="0070C0"/>
+                </a:solidFill>
+              </a:defRPr>
+            </a:lvl1pPr>
+          </a:lstStyle>
+          <a:p>
+            <a:pPr algn="ctr"/>
+            <a:r>
+              <a:rPr lang="en-GB" dirty="0"/>
+              <a:t>Society Discovery and Enrolment</a:t>
+            </a:r>
+          </a:p>
+        </p:txBody>
+      </p:sp>
+      <p:sp>
+        <p:nvSpPr>
+          <p:cNvPr id="45" name="TextBox 44">
+            <a:extLst>
+              <a:ext uri="{FF2B5EF4-FFF2-40B4-BE49-F238E27FC236}">
+                <a16:creationId xmlns:a16="http://schemas.microsoft.com/office/drawing/2014/main" id="{C20D495A-B85A-CDA8-1B9F-AA733C06E0E0}"/>
+              </a:ext>
+            </a:extLst>
+          </p:cNvPr>
+          <p:cNvSpPr txBox="1"/>
+          <p:nvPr/>
+        </p:nvSpPr>
+        <p:spPr>
+          <a:xfrm>
+            <a:off x="12282422" y="6275523"/>
+            <a:ext cx="8793766" cy="369332"/>
+          </a:xfrm>
+          <a:prstGeom prst="rect">
+            <a:avLst/>
+          </a:prstGeom>
+          <a:noFill/>
+        </p:spPr>
+        <p:txBody>
+          <a:bodyPr wrap="square">
+            <a:spAutoFit/>
+          </a:bodyPr>
+          <a:lstStyle>
+            <a:defPPr>
+              <a:defRPr lang="en-US"/>
+            </a:defPPr>
+            <a:lvl1pPr algn="ctr">
+              <a:defRPr>
+                <a:solidFill>
+                  <a:srgbClr val="0070C0"/>
+                </a:solidFill>
+              </a:defRPr>
+            </a:lvl1pPr>
+          </a:lstStyle>
+          <a:p>
+            <a:r>
+              <a:rPr lang="en-GB" dirty="0"/>
+              <a:t>Committee Post Publishing</a:t>
+            </a:r>
+          </a:p>
+        </p:txBody>
+      </p:sp>
+      <p:sp>
+        <p:nvSpPr>
+          <p:cNvPr id="49" name="TextBox 48">
+            <a:extLst>
+              <a:ext uri="{FF2B5EF4-FFF2-40B4-BE49-F238E27FC236}">
+                <a16:creationId xmlns:a16="http://schemas.microsoft.com/office/drawing/2014/main" id="{1CB30414-F151-F0D3-2F84-6AA82F536FA7}"/>
+              </a:ext>
+            </a:extLst>
+          </p:cNvPr>
+          <p:cNvSpPr txBox="1"/>
+          <p:nvPr/>
+        </p:nvSpPr>
+        <p:spPr>
+          <a:xfrm>
+            <a:off x="12073781" y="13356759"/>
+            <a:ext cx="9002407" cy="923330"/>
+          </a:xfrm>
+          <a:prstGeom prst="rect">
+            <a:avLst/>
+          </a:prstGeom>
+          <a:noFill/>
+        </p:spPr>
+        <p:txBody>
+          <a:bodyPr wrap="square">
+            <a:spAutoFit/>
+          </a:bodyPr>
+          <a:lstStyle/>
+          <a:p>
+            <a:pPr algn="ctr"/>
+            <a:r>
+              <a:rPr lang="en-GB" dirty="0"/>
+              <a:t>Committee members use this tool to write posts. If the author links an event to the post, the system checks that the event exists. Once the check passes, the post is saved to the database.</a:t>
+            </a:r>
+          </a:p>
+        </p:txBody>
+      </p:sp>
+      <p:sp>
+        <p:nvSpPr>
+          <p:cNvPr id="53" name="TextBox 52">
+            <a:extLst>
+              <a:ext uri="{FF2B5EF4-FFF2-40B4-BE49-F238E27FC236}">
+                <a16:creationId xmlns:a16="http://schemas.microsoft.com/office/drawing/2014/main" id="{A89BFF9A-E351-AA4F-28EB-C69581ED17A7}"/>
+              </a:ext>
+            </a:extLst>
+          </p:cNvPr>
+          <p:cNvSpPr txBox="1"/>
+          <p:nvPr/>
+        </p:nvSpPr>
+        <p:spPr>
+          <a:xfrm>
+            <a:off x="2058697" y="20311907"/>
+            <a:ext cx="7296430" cy="1200329"/>
+          </a:xfrm>
+          <a:prstGeom prst="rect">
+            <a:avLst/>
+          </a:prstGeom>
+          <a:noFill/>
+        </p:spPr>
+        <p:txBody>
+          <a:bodyPr wrap="square">
+            <a:spAutoFit/>
+          </a:bodyPr>
+          <a:lstStyle/>
+          <a:p>
+            <a:pPr algn="ctr"/>
+            <a:r>
+              <a:rPr lang="en-GB" dirty="0"/>
+              <a:t>A committee member enters event details like time and location. The system validates the information and saves it to the database. This action also triggers an update to the main calendar file, so it remains accurate for future user downloads.</a:t>
+            </a:r>
+          </a:p>
+        </p:txBody>
+      </p:sp>
+      <p:sp>
+        <p:nvSpPr>
+          <p:cNvPr id="57" name="TextBox 56">
+            <a:extLst>
+              <a:ext uri="{FF2B5EF4-FFF2-40B4-BE49-F238E27FC236}">
+                <a16:creationId xmlns:a16="http://schemas.microsoft.com/office/drawing/2014/main" id="{82F79552-A73C-758B-BADB-A35608365BE6}"/>
+              </a:ext>
+            </a:extLst>
+          </p:cNvPr>
+          <p:cNvSpPr txBox="1"/>
+          <p:nvPr/>
+        </p:nvSpPr>
+        <p:spPr>
+          <a:xfrm>
+            <a:off x="2058698" y="16009224"/>
+            <a:ext cx="7296430" cy="369332"/>
+          </a:xfrm>
+          <a:prstGeom prst="rect">
+            <a:avLst/>
+          </a:prstGeom>
+          <a:noFill/>
+        </p:spPr>
+        <p:txBody>
+          <a:bodyPr wrap="square">
+            <a:spAutoFit/>
+          </a:bodyPr>
+          <a:lstStyle>
+            <a:defPPr>
+              <a:defRPr lang="en-US"/>
+            </a:defPPr>
+            <a:lvl1pPr algn="ctr">
+              <a:defRPr>
+                <a:solidFill>
+                  <a:srgbClr val="0070C0"/>
+                </a:solidFill>
+              </a:defRPr>
+            </a:lvl1pPr>
+          </a:lstStyle>
+          <a:p>
+            <a:r>
+              <a:rPr lang="en-GB" dirty="0"/>
+              <a:t>Committee Event Management</a:t>
+            </a:r>
+          </a:p>
+        </p:txBody>
+      </p:sp>
+      <p:sp>
+        <p:nvSpPr>
+          <p:cNvPr id="61" name="TextBox 60">
+            <a:extLst>
+              <a:ext uri="{FF2B5EF4-FFF2-40B4-BE49-F238E27FC236}">
+                <a16:creationId xmlns:a16="http://schemas.microsoft.com/office/drawing/2014/main" id="{EAB7DBE7-D8C9-30CD-CD45-1286B34D53ED}"/>
+              </a:ext>
+            </a:extLst>
+          </p:cNvPr>
+          <p:cNvSpPr txBox="1"/>
+          <p:nvPr/>
+        </p:nvSpPr>
+        <p:spPr>
+          <a:xfrm>
+            <a:off x="11747233" y="4527778"/>
+            <a:ext cx="9002407" cy="923330"/>
+          </a:xfrm>
+          <a:prstGeom prst="rect">
+            <a:avLst/>
+          </a:prstGeom>
+          <a:noFill/>
+        </p:spPr>
+        <p:txBody>
+          <a:bodyPr wrap="square">
+            <a:spAutoFit/>
+          </a:bodyPr>
+          <a:lstStyle/>
+          <a:p>
+            <a:pPr algn="ctr"/>
+            <a:r>
+              <a:rPr lang="en-GB" dirty="0"/>
+              <a:t>A user clicks the like button on a post. The system calculates the new total and saves the update in the database. The screen immediately refreshes to display the new number of likes.</a:t>
+            </a:r>
+          </a:p>
+        </p:txBody>
+      </p:sp>
+      <p:sp>
+        <p:nvSpPr>
+          <p:cNvPr id="65" name="TextBox 64">
+            <a:extLst>
+              <a:ext uri="{FF2B5EF4-FFF2-40B4-BE49-F238E27FC236}">
+                <a16:creationId xmlns:a16="http://schemas.microsoft.com/office/drawing/2014/main" id="{EDD7EB56-BAE0-4F42-AEA1-9D8748E0D99B}"/>
+              </a:ext>
+            </a:extLst>
+          </p:cNvPr>
+          <p:cNvSpPr txBox="1"/>
+          <p:nvPr/>
+        </p:nvSpPr>
+        <p:spPr>
+          <a:xfrm>
+            <a:off x="11747233" y="933237"/>
+            <a:ext cx="9002407" cy="369332"/>
+          </a:xfrm>
+          <a:prstGeom prst="rect">
+            <a:avLst/>
+          </a:prstGeom>
+          <a:noFill/>
+        </p:spPr>
+        <p:txBody>
+          <a:bodyPr wrap="square">
+            <a:spAutoFit/>
+          </a:bodyPr>
+          <a:lstStyle>
+            <a:defPPr>
+              <a:defRPr lang="en-US"/>
+            </a:defPPr>
+            <a:lvl1pPr algn="ctr">
+              <a:defRPr>
+                <a:solidFill>
+                  <a:srgbClr val="0070C0"/>
+                </a:solidFill>
+              </a:defRPr>
+            </a:lvl1pPr>
+          </a:lstStyle>
+          <a:p>
+            <a:r>
+              <a:rPr lang="en-GB" dirty="0"/>
+              <a:t>Member Content Engagement</a:t>
+            </a:r>
+          </a:p>
+        </p:txBody>
+      </p:sp>
     </p:spTree>
     <p:extLst>
       <p:ext uri="{BB962C8B-B14F-4D97-AF65-F5344CB8AC3E}">

</xml_diff>